<commit_message>
Adds minor changes to presentation
</commit_message>
<xml_diff>
--- a/Project Presentation.pptx
+++ b/Project Presentation.pptx
@@ -35174,12 +35174,20 @@
               <a:buChar char="•"/>
             </a:pPr>
             <a:r>
+              <a:rPr lang="it-IT" sz="1800" u="sng" dirty="0" err="1">
+                <a:solidFill>
+                  <a:srgbClr val="003366"/>
+                </a:solidFill>
+              </a:rPr>
+              <a:t>Bankruptcy</a:t>
+            </a:r>
+            <a:r>
               <a:rPr lang="it-IT" sz="1800" u="sng" dirty="0">
                 <a:solidFill>
                   <a:srgbClr val="003366"/>
                 </a:solidFill>
               </a:rPr>
-              <a:t>Competitors:</a:t>
+              <a:t>:</a:t>
             </a:r>
             <a:r>
               <a:rPr lang="it-IT" sz="1800" dirty="0">
@@ -35187,7 +35195,7 @@
                   <a:srgbClr val="003366"/>
                 </a:solidFill>
               </a:rPr>
-              <a:t> in </a:t>
+              <a:t> a </a:t>
             </a:r>
             <a:r>
               <a:rPr lang="it-IT" sz="1800" dirty="0" err="1">
@@ -35195,7 +35203,7 @@
                   <a:srgbClr val="003366"/>
                 </a:solidFill>
               </a:rPr>
-              <a:t>order</a:t>
+              <a:t>good</a:t>
             </a:r>
             <a:r>
               <a:rPr lang="it-IT" sz="1800" dirty="0">
@@ -35203,7 +35211,7 @@
                   <a:srgbClr val="003366"/>
                 </a:solidFill>
               </a:rPr>
-              <a:t> to </a:t>
+              <a:t> </a:t>
             </a:r>
             <a:r>
               <a:rPr lang="it-IT" sz="1800" dirty="0" err="1">
@@ -35211,7 +35219,7 @@
                   <a:srgbClr val="003366"/>
                 </a:solidFill>
               </a:rPr>
-              <a:t>avoid</a:t>
+              <a:t>feasibility</a:t>
             </a:r>
             <a:r>
               <a:rPr lang="it-IT" sz="1800" dirty="0">
@@ -35227,7 +35235,7 @@
                   <a:srgbClr val="003366"/>
                 </a:solidFill>
               </a:rPr>
-              <a:t>economical</a:t>
+              <a:t>study</a:t>
             </a:r>
             <a:r>
               <a:rPr lang="it-IT" sz="1800" dirty="0">
@@ -35243,7 +35251,7 @@
                   <a:srgbClr val="003366"/>
                 </a:solidFill>
               </a:rPr>
-              <a:t>losses</a:t>
+              <a:t>should</a:t>
             </a:r>
             <a:r>
               <a:rPr lang="it-IT" sz="1800" dirty="0">
@@ -35251,6 +35259,22 @@
                   <a:srgbClr val="003366"/>
                 </a:solidFill>
               </a:rPr>
+              <a:t> help </a:t>
+            </a:r>
+            <a:r>
+              <a:rPr lang="it-IT" sz="1800" dirty="0" err="1">
+                <a:solidFill>
+                  <a:srgbClr val="003366"/>
+                </a:solidFill>
+              </a:rPr>
+              <a:t>avoiding</a:t>
+            </a:r>
+            <a:r>
+              <a:rPr lang="it-IT" sz="1800" dirty="0">
+                <a:solidFill>
+                  <a:srgbClr val="003366"/>
+                </a:solidFill>
+              </a:rPr>
               <a:t> </a:t>
             </a:r>
             <a:r>
@@ -35259,7 +35283,7 @@
                   <a:srgbClr val="003366"/>
                 </a:solidFill>
               </a:rPr>
-              <a:t>brought</a:t>
+              <a:t>this</a:t>
             </a:r>
             <a:r>
               <a:rPr lang="it-IT" sz="1800" dirty="0">
@@ -35267,7 +35291,7 @@
                   <a:srgbClr val="003366"/>
                 </a:solidFill>
               </a:rPr>
-              <a:t> by </a:t>
+              <a:t> </a:t>
             </a:r>
             <a:r>
               <a:rPr lang="it-IT" sz="1800" dirty="0" err="1">
@@ -35275,7 +35299,15 @@
                   <a:srgbClr val="003366"/>
                 </a:solidFill>
               </a:rPr>
-              <a:t>possible</a:t>
+              <a:t>critical</a:t>
+            </a:r>
+            <a:r>
+              <a:rPr lang="it-IT" sz="1800">
+                <a:solidFill>
+                  <a:srgbClr val="003366"/>
+                </a:solidFill>
+              </a:rPr>
+              <a:t> situation</a:t>
             </a:r>
             <a:r>
               <a:rPr lang="it-IT" sz="1800" dirty="0">
@@ -35283,135 +35315,7 @@
                   <a:srgbClr val="003366"/>
                 </a:solidFill>
               </a:rPr>
-              <a:t> competitors, </a:t>
-            </a:r>
-            <a:r>
-              <a:rPr lang="it-IT" sz="1800" dirty="0" err="1">
-                <a:solidFill>
-                  <a:srgbClr val="003366"/>
-                </a:solidFill>
-              </a:rPr>
-              <a:t>we</a:t>
-            </a:r>
-            <a:r>
-              <a:rPr lang="it-IT" sz="1800" dirty="0">
-                <a:solidFill>
-                  <a:srgbClr val="003366"/>
-                </a:solidFill>
-              </a:rPr>
-              <a:t> must </a:t>
-            </a:r>
-            <a:r>
-              <a:rPr lang="it-IT" sz="1800" dirty="0" err="1">
-                <a:solidFill>
-                  <a:srgbClr val="003366"/>
-                </a:solidFill>
-              </a:rPr>
-              <a:t>continuously</a:t>
-            </a:r>
-            <a:r>
-              <a:rPr lang="it-IT" sz="1800" dirty="0">
-                <a:solidFill>
-                  <a:srgbClr val="003366"/>
-                </a:solidFill>
-              </a:rPr>
-              <a:t> </a:t>
-            </a:r>
-            <a:r>
-              <a:rPr lang="it-IT" sz="1800" dirty="0" err="1">
-                <a:solidFill>
-                  <a:srgbClr val="003366"/>
-                </a:solidFill>
-              </a:rPr>
-              <a:t>provide</a:t>
-            </a:r>
-            <a:r>
-              <a:rPr lang="it-IT" sz="1800" dirty="0">
-                <a:solidFill>
-                  <a:srgbClr val="003366"/>
-                </a:solidFill>
-              </a:rPr>
-              <a:t> new </a:t>
-            </a:r>
-            <a:r>
-              <a:rPr lang="it-IT" sz="1800" dirty="0" err="1">
-                <a:solidFill>
-                  <a:srgbClr val="003366"/>
-                </a:solidFill>
-              </a:rPr>
-              <a:t>appealing</a:t>
-            </a:r>
-            <a:r>
-              <a:rPr lang="it-IT" sz="1800" dirty="0">
-                <a:solidFill>
-                  <a:srgbClr val="003366"/>
-                </a:solidFill>
-              </a:rPr>
-              <a:t> </a:t>
-            </a:r>
-            <a:r>
-              <a:rPr lang="it-IT" sz="1800" dirty="0" err="1">
-                <a:solidFill>
-                  <a:srgbClr val="003366"/>
-                </a:solidFill>
-              </a:rPr>
-              <a:t>functionalities</a:t>
-            </a:r>
-            <a:r>
-              <a:rPr lang="it-IT" sz="1800" dirty="0">
-                <a:solidFill>
-                  <a:srgbClr val="003366"/>
-                </a:solidFill>
-              </a:rPr>
-              <a:t> </a:t>
-            </a:r>
-            <a:r>
-              <a:rPr lang="it-IT" sz="1800" dirty="0" err="1">
-                <a:solidFill>
-                  <a:srgbClr val="003366"/>
-                </a:solidFill>
-              </a:rPr>
-              <a:t>also</a:t>
-            </a:r>
-            <a:r>
-              <a:rPr lang="it-IT" sz="1800" dirty="0">
-                <a:solidFill>
-                  <a:srgbClr val="003366"/>
-                </a:solidFill>
-              </a:rPr>
-              <a:t> </a:t>
-            </a:r>
-            <a:r>
-              <a:rPr lang="it-IT" sz="1800" dirty="0" err="1">
-                <a:solidFill>
-                  <a:srgbClr val="003366"/>
-                </a:solidFill>
-              </a:rPr>
-              <a:t>based</a:t>
-            </a:r>
-            <a:r>
-              <a:rPr lang="it-IT" sz="1800" dirty="0">
-                <a:solidFill>
-                  <a:srgbClr val="003366"/>
-                </a:solidFill>
-              </a:rPr>
-              <a:t> on the </a:t>
-            </a:r>
-            <a:r>
-              <a:rPr lang="it-IT" sz="1800" dirty="0" err="1">
-                <a:solidFill>
-                  <a:srgbClr val="003366"/>
-                </a:solidFill>
-              </a:rPr>
-              <a:t>customer</a:t>
-            </a:r>
-            <a:r>
-              <a:rPr lang="it-IT" sz="1800" dirty="0">
-                <a:solidFill>
-                  <a:srgbClr val="003366"/>
-                </a:solidFill>
-              </a:rPr>
-              <a:t> feedback.</a:t>
+              <a:t>.</a:t>
             </a:r>
           </a:p>
         </p:txBody>

</xml_diff>